<commit_message>
Finished added narrations to the claims videos
</commit_message>
<xml_diff>
--- a/PowerPoints/Phase 3 - Claims Terminology/014 Procedure Codes and Revenue Codes.pptx
+++ b/PowerPoints/Phase 3 - Claims Terminology/014 Procedure Codes and Revenue Codes.pptx
@@ -109,6 +109,22 @@
       </a:defRPr>
     </a:lvl9pPr>
   </p:defaultTextStyle>
+  <p:extLst>
+    <p:ext uri="{EFAFB233-063F-42B5-8137-9DF3F51BA10A}">
+      <p15:sldGuideLst xmlns:p15="http://schemas.microsoft.com/office/powerpoint/2012/main">
+        <p15:guide id="1" orient="horz" pos="2160">
+          <p15:clr>
+            <a:srgbClr val="A4A3A4"/>
+          </p15:clr>
+        </p15:guide>
+        <p15:guide id="2" pos="3840">
+          <p15:clr>
+            <a:srgbClr val="A4A3A4"/>
+          </p15:clr>
+        </p15:guide>
+      </p15:sldGuideLst>
+    </p:ext>
+  </p:extLst>
 </p:presentation>
 </file>
 
@@ -156,7 +172,7 @@
           </a:lstStyle>
           <a:p>
             <a:r>
-              <a:rPr lang="en-US" smtClean="0"/>
+              <a:rPr lang="en-US"/>
               <a:t>Click to edit Master title style</a:t>
             </a:r>
             <a:endParaRPr lang="en-US" dirty="0"/>
@@ -230,7 +246,7 @@
           </a:lstStyle>
           <a:p>
             <a:r>
-              <a:rPr lang="en-US" smtClean="0"/>
+              <a:rPr lang="en-US"/>
               <a:t>Click to edit Master subtitle style</a:t>
             </a:r>
             <a:endParaRPr lang="en-US" dirty="0"/>
@@ -254,7 +270,7 @@
           <a:p>
             <a:fld id="{FF632088-7E42-4B13-8645-6CA4616862AF}" type="datetimeFigureOut">
               <a:rPr lang="en-US" smtClean="0"/>
-              <a:t>3/2/2016</a:t>
+              <a:t>3/5/2016</a:t>
             </a:fld>
             <a:endParaRPr lang="en-US"/>
           </a:p>
@@ -348,10 +364,9 @@
           <a:lstStyle/>
           <a:p>
             <a:r>
-              <a:rPr lang="en-US" smtClean="0"/>
+              <a:rPr lang="en-US"/>
               <a:t>Click to edit Master title style</a:t>
             </a:r>
-            <a:endParaRPr lang="en-US"/>
           </a:p>
         </p:txBody>
       </p:sp>
@@ -372,35 +387,35 @@
           <a:p>
             <a:pPr lvl="0"/>
             <a:r>
-              <a:rPr lang="en-US" smtClean="0"/>
+              <a:rPr lang="en-US"/>
               <a:t>Edit Master text styles</a:t>
             </a:r>
           </a:p>
           <a:p>
             <a:pPr lvl="1"/>
             <a:r>
-              <a:rPr lang="en-US" smtClean="0"/>
+              <a:rPr lang="en-US"/>
               <a:t>Second level</a:t>
             </a:r>
           </a:p>
           <a:p>
             <a:pPr lvl="2"/>
             <a:r>
-              <a:rPr lang="en-US" smtClean="0"/>
+              <a:rPr lang="en-US"/>
               <a:t>Third level</a:t>
             </a:r>
           </a:p>
           <a:p>
             <a:pPr lvl="3"/>
             <a:r>
-              <a:rPr lang="en-US" smtClean="0"/>
+              <a:rPr lang="en-US"/>
               <a:t>Fourth level</a:t>
             </a:r>
           </a:p>
           <a:p>
             <a:pPr lvl="4"/>
             <a:r>
-              <a:rPr lang="en-US" smtClean="0"/>
+              <a:rPr lang="en-US"/>
               <a:t>Fifth level</a:t>
             </a:r>
             <a:endParaRPr lang="en-US" dirty="0"/>
@@ -424,7 +439,7 @@
           <a:p>
             <a:fld id="{FF632088-7E42-4B13-8645-6CA4616862AF}" type="datetimeFigureOut">
               <a:rPr lang="en-US" smtClean="0"/>
-              <a:t>3/2/2016</a:t>
+              <a:t>3/5/2016</a:t>
             </a:fld>
             <a:endParaRPr lang="en-US"/>
           </a:p>
@@ -523,10 +538,9 @@
           <a:lstStyle/>
           <a:p>
             <a:r>
-              <a:rPr lang="en-US" smtClean="0"/>
+              <a:rPr lang="en-US"/>
               <a:t>Click to edit Master title style</a:t>
             </a:r>
-            <a:endParaRPr lang="en-US"/>
           </a:p>
         </p:txBody>
       </p:sp>
@@ -552,38 +566,37 @@
           <a:p>
             <a:pPr lvl="0"/>
             <a:r>
-              <a:rPr lang="en-US" smtClean="0"/>
+              <a:rPr lang="en-US"/>
               <a:t>Edit Master text styles</a:t>
             </a:r>
           </a:p>
           <a:p>
             <a:pPr lvl="1"/>
             <a:r>
-              <a:rPr lang="en-US" smtClean="0"/>
+              <a:rPr lang="en-US"/>
               <a:t>Second level</a:t>
             </a:r>
           </a:p>
           <a:p>
             <a:pPr lvl="2"/>
             <a:r>
-              <a:rPr lang="en-US" smtClean="0"/>
+              <a:rPr lang="en-US"/>
               <a:t>Third level</a:t>
             </a:r>
           </a:p>
           <a:p>
             <a:pPr lvl="3"/>
             <a:r>
-              <a:rPr lang="en-US" smtClean="0"/>
+              <a:rPr lang="en-US"/>
               <a:t>Fourth level</a:t>
             </a:r>
           </a:p>
           <a:p>
             <a:pPr lvl="4"/>
             <a:r>
-              <a:rPr lang="en-US" smtClean="0"/>
+              <a:rPr lang="en-US"/>
               <a:t>Fifth level</a:t>
             </a:r>
-            <a:endParaRPr lang="en-US"/>
           </a:p>
         </p:txBody>
       </p:sp>
@@ -604,7 +617,7 @@
           <a:p>
             <a:fld id="{FF632088-7E42-4B13-8645-6CA4616862AF}" type="datetimeFigureOut">
               <a:rPr lang="en-US" smtClean="0"/>
-              <a:t>3/2/2016</a:t>
+              <a:t>3/5/2016</a:t>
             </a:fld>
             <a:endParaRPr lang="en-US"/>
           </a:p>
@@ -709,7 +722,7 @@
           </a:lstStyle>
           <a:p>
             <a:r>
-              <a:rPr lang="en-US" smtClean="0"/>
+              <a:rPr lang="en-US"/>
               <a:t>Click to edit Master title style</a:t>
             </a:r>
             <a:endParaRPr lang="en-US" dirty="0"/>
@@ -780,7 +793,7 @@
           </a:lstStyle>
           <a:p>
             <a:r>
-              <a:rPr lang="en-US" smtClean="0"/>
+              <a:rPr lang="en-US"/>
               <a:t>Click to edit Master subtitle style</a:t>
             </a:r>
             <a:endParaRPr lang="en-US" dirty="0"/>
@@ -804,7 +817,7 @@
           <a:p>
             <a:fld id="{FF632088-7E42-4B13-8645-6CA4616862AF}" type="datetimeFigureOut">
               <a:rPr lang="en-US" smtClean="0"/>
-              <a:t>3/2/2016</a:t>
+              <a:t>3/5/2016</a:t>
             </a:fld>
             <a:endParaRPr lang="en-US"/>
           </a:p>
@@ -945,7 +958,7 @@
           <a:lstStyle/>
           <a:p>
             <a:r>
-              <a:rPr lang="en-US" smtClean="0"/>
+              <a:rPr lang="en-US"/>
               <a:t>Click to edit Master title style</a:t>
             </a:r>
             <a:endParaRPr lang="en-US" dirty="0"/>
@@ -969,35 +982,35 @@
           <a:p>
             <a:pPr lvl="0"/>
             <a:r>
-              <a:rPr lang="en-US" smtClean="0"/>
+              <a:rPr lang="en-US"/>
               <a:t>Edit Master text styles</a:t>
             </a:r>
           </a:p>
           <a:p>
             <a:pPr lvl="1"/>
             <a:r>
-              <a:rPr lang="en-US" smtClean="0"/>
+              <a:rPr lang="en-US"/>
               <a:t>Second level</a:t>
             </a:r>
           </a:p>
           <a:p>
             <a:pPr lvl="2"/>
             <a:r>
-              <a:rPr lang="en-US" smtClean="0"/>
+              <a:rPr lang="en-US"/>
               <a:t>Third level</a:t>
             </a:r>
           </a:p>
           <a:p>
             <a:pPr lvl="3"/>
             <a:r>
-              <a:rPr lang="en-US" smtClean="0"/>
+              <a:rPr lang="en-US"/>
               <a:t>Fourth level</a:t>
             </a:r>
           </a:p>
           <a:p>
             <a:pPr lvl="4"/>
             <a:r>
-              <a:rPr lang="en-US" smtClean="0"/>
+              <a:rPr lang="en-US"/>
               <a:t>Fifth level</a:t>
             </a:r>
             <a:endParaRPr lang="en-US" dirty="0"/>
@@ -1021,7 +1034,7 @@
           <a:p>
             <a:fld id="{FF632088-7E42-4B13-8645-6CA4616862AF}" type="datetimeFigureOut">
               <a:rPr lang="en-US" smtClean="0"/>
-              <a:t>3/2/2016</a:t>
+              <a:t>3/5/2016</a:t>
             </a:fld>
             <a:endParaRPr lang="en-US"/>
           </a:p>
@@ -1163,7 +1176,7 @@
           </a:lstStyle>
           <a:p>
             <a:r>
-              <a:rPr lang="en-US" smtClean="0"/>
+              <a:rPr lang="en-US"/>
               <a:t>Click to edit Master title style</a:t>
             </a:r>
             <a:endParaRPr lang="en-US" dirty="0"/>
@@ -1283,7 +1296,7 @@
           <a:p>
             <a:pPr lvl="0"/>
             <a:r>
-              <a:rPr lang="en-US" smtClean="0"/>
+              <a:rPr lang="en-US"/>
               <a:t>Edit Master text styles</a:t>
             </a:r>
           </a:p>
@@ -1306,7 +1319,7 @@
           <a:p>
             <a:fld id="{FF632088-7E42-4B13-8645-6CA4616862AF}" type="datetimeFigureOut">
               <a:rPr lang="en-US" smtClean="0"/>
-              <a:t>3/2/2016</a:t>
+              <a:t>3/5/2016</a:t>
             </a:fld>
             <a:endParaRPr lang="en-US"/>
           </a:p>
@@ -1442,7 +1455,7 @@
           <a:lstStyle/>
           <a:p>
             <a:r>
-              <a:rPr lang="en-US" smtClean="0"/>
+              <a:rPr lang="en-US"/>
               <a:t>Click to edit Master title style</a:t>
             </a:r>
             <a:endParaRPr lang="en-US" dirty="0"/>
@@ -1471,35 +1484,35 @@
           <a:p>
             <a:pPr lvl="0"/>
             <a:r>
-              <a:rPr lang="en-US" smtClean="0"/>
+              <a:rPr lang="en-US"/>
               <a:t>Edit Master text styles</a:t>
             </a:r>
           </a:p>
           <a:p>
             <a:pPr lvl="1"/>
             <a:r>
-              <a:rPr lang="en-US" smtClean="0"/>
+              <a:rPr lang="en-US"/>
               <a:t>Second level</a:t>
             </a:r>
           </a:p>
           <a:p>
             <a:pPr lvl="2"/>
             <a:r>
-              <a:rPr lang="en-US" smtClean="0"/>
+              <a:rPr lang="en-US"/>
               <a:t>Third level</a:t>
             </a:r>
           </a:p>
           <a:p>
             <a:pPr lvl="3"/>
             <a:r>
-              <a:rPr lang="en-US" smtClean="0"/>
+              <a:rPr lang="en-US"/>
               <a:t>Fourth level</a:t>
             </a:r>
           </a:p>
           <a:p>
             <a:pPr lvl="4"/>
             <a:r>
-              <a:rPr lang="en-US" smtClean="0"/>
+              <a:rPr lang="en-US"/>
               <a:t>Fifth level</a:t>
             </a:r>
             <a:endParaRPr lang="en-US" dirty="0"/>
@@ -1528,35 +1541,35 @@
           <a:p>
             <a:pPr lvl="0"/>
             <a:r>
-              <a:rPr lang="en-US" smtClean="0"/>
+              <a:rPr lang="en-US"/>
               <a:t>Edit Master text styles</a:t>
             </a:r>
           </a:p>
           <a:p>
             <a:pPr lvl="1"/>
             <a:r>
-              <a:rPr lang="en-US" smtClean="0"/>
+              <a:rPr lang="en-US"/>
               <a:t>Second level</a:t>
             </a:r>
           </a:p>
           <a:p>
             <a:pPr lvl="2"/>
             <a:r>
-              <a:rPr lang="en-US" smtClean="0"/>
+              <a:rPr lang="en-US"/>
               <a:t>Third level</a:t>
             </a:r>
           </a:p>
           <a:p>
             <a:pPr lvl="3"/>
             <a:r>
-              <a:rPr lang="en-US" smtClean="0"/>
+              <a:rPr lang="en-US"/>
               <a:t>Fourth level</a:t>
             </a:r>
           </a:p>
           <a:p>
             <a:pPr lvl="4"/>
             <a:r>
-              <a:rPr lang="en-US" smtClean="0"/>
+              <a:rPr lang="en-US"/>
               <a:t>Fifth level</a:t>
             </a:r>
             <a:endParaRPr lang="en-US" dirty="0"/>
@@ -1580,7 +1593,7 @@
           <a:p>
             <a:fld id="{FF632088-7E42-4B13-8645-6CA4616862AF}" type="datetimeFigureOut">
               <a:rPr lang="en-US" smtClean="0"/>
-              <a:t>3/2/2016</a:t>
+              <a:t>3/5/2016</a:t>
             </a:fld>
             <a:endParaRPr lang="en-US"/>
           </a:p>
@@ -1677,7 +1690,7 @@
   </p:clrMapOvr>
   <p:extLst>
     <p:ext uri="{DCECCB84-F9BA-43D5-87BE-67443E8EF086}">
-      <p15:sldGuideLst xmlns:p15="http://schemas.microsoft.com/office/powerpoint/2012/main" xmlns=""/>
+      <p15:sldGuideLst xmlns:p15="http://schemas.microsoft.com/office/powerpoint/2012/main"/>
     </p:ext>
   </p:extLst>
 </p:sldLayout>
@@ -1721,7 +1734,7 @@
           <a:lstStyle/>
           <a:p>
             <a:r>
-              <a:rPr lang="en-US" smtClean="0"/>
+              <a:rPr lang="en-US"/>
               <a:t>Click to edit Master title style</a:t>
             </a:r>
             <a:endParaRPr lang="en-US" dirty="0"/>
@@ -1796,7 +1809,7 @@
           <a:p>
             <a:pPr lvl="0"/>
             <a:r>
-              <a:rPr lang="en-US" smtClean="0"/>
+              <a:rPr lang="en-US"/>
               <a:t>Edit Master text styles</a:t>
             </a:r>
           </a:p>
@@ -1824,35 +1837,35 @@
           <a:p>
             <a:pPr lvl="0"/>
             <a:r>
-              <a:rPr lang="en-US" smtClean="0"/>
+              <a:rPr lang="en-US"/>
               <a:t>Edit Master text styles</a:t>
             </a:r>
           </a:p>
           <a:p>
             <a:pPr lvl="1"/>
             <a:r>
-              <a:rPr lang="en-US" smtClean="0"/>
+              <a:rPr lang="en-US"/>
               <a:t>Second level</a:t>
             </a:r>
           </a:p>
           <a:p>
             <a:pPr lvl="2"/>
             <a:r>
-              <a:rPr lang="en-US" smtClean="0"/>
+              <a:rPr lang="en-US"/>
               <a:t>Third level</a:t>
             </a:r>
           </a:p>
           <a:p>
             <a:pPr lvl="3"/>
             <a:r>
-              <a:rPr lang="en-US" smtClean="0"/>
+              <a:rPr lang="en-US"/>
               <a:t>Fourth level</a:t>
             </a:r>
           </a:p>
           <a:p>
             <a:pPr lvl="4"/>
             <a:r>
-              <a:rPr lang="en-US" smtClean="0"/>
+              <a:rPr lang="en-US"/>
               <a:t>Fifth level</a:t>
             </a:r>
             <a:endParaRPr lang="en-US" dirty="0"/>
@@ -1927,7 +1940,7 @@
           <a:p>
             <a:pPr lvl="0"/>
             <a:r>
-              <a:rPr lang="en-US" smtClean="0"/>
+              <a:rPr lang="en-US"/>
               <a:t>Edit Master text styles</a:t>
             </a:r>
           </a:p>
@@ -1955,35 +1968,35 @@
           <a:p>
             <a:pPr lvl="0"/>
             <a:r>
-              <a:rPr lang="en-US" smtClean="0"/>
+              <a:rPr lang="en-US"/>
               <a:t>Edit Master text styles</a:t>
             </a:r>
           </a:p>
           <a:p>
             <a:pPr lvl="1"/>
             <a:r>
-              <a:rPr lang="en-US" smtClean="0"/>
+              <a:rPr lang="en-US"/>
               <a:t>Second level</a:t>
             </a:r>
           </a:p>
           <a:p>
             <a:pPr lvl="2"/>
             <a:r>
-              <a:rPr lang="en-US" smtClean="0"/>
+              <a:rPr lang="en-US"/>
               <a:t>Third level</a:t>
             </a:r>
           </a:p>
           <a:p>
             <a:pPr lvl="3"/>
             <a:r>
-              <a:rPr lang="en-US" smtClean="0"/>
+              <a:rPr lang="en-US"/>
               <a:t>Fourth level</a:t>
             </a:r>
           </a:p>
           <a:p>
             <a:pPr lvl="4"/>
             <a:r>
-              <a:rPr lang="en-US" smtClean="0"/>
+              <a:rPr lang="en-US"/>
               <a:t>Fifth level</a:t>
             </a:r>
             <a:endParaRPr lang="en-US" dirty="0"/>
@@ -2007,7 +2020,7 @@
           <a:p>
             <a:fld id="{FF632088-7E42-4B13-8645-6CA4616862AF}" type="datetimeFigureOut">
               <a:rPr lang="en-US" smtClean="0"/>
-              <a:t>3/2/2016</a:t>
+              <a:t>3/5/2016</a:t>
             </a:fld>
             <a:endParaRPr lang="en-US"/>
           </a:p>
@@ -2104,7 +2117,7 @@
   </p:clrMapOvr>
   <p:extLst>
     <p:ext uri="{DCECCB84-F9BA-43D5-87BE-67443E8EF086}">
-      <p15:sldGuideLst xmlns:p15="http://schemas.microsoft.com/office/powerpoint/2012/main" xmlns=""/>
+      <p15:sldGuideLst xmlns:p15="http://schemas.microsoft.com/office/powerpoint/2012/main"/>
     </p:ext>
   </p:extLst>
 </p:sldLayout>
@@ -2143,7 +2156,7 @@
           <a:lstStyle/>
           <a:p>
             <a:r>
-              <a:rPr lang="en-US" smtClean="0"/>
+              <a:rPr lang="en-US"/>
               <a:t>Click to edit Master title style</a:t>
             </a:r>
             <a:endParaRPr lang="en-US" dirty="0"/>
@@ -2167,7 +2180,7 @@
           <a:p>
             <a:fld id="{FF632088-7E42-4B13-8645-6CA4616862AF}" type="datetimeFigureOut">
               <a:rPr lang="en-US" smtClean="0"/>
-              <a:t>3/2/2016</a:t>
+              <a:t>3/5/2016</a:t>
             </a:fld>
             <a:endParaRPr lang="en-US"/>
           </a:p>
@@ -2299,7 +2312,7 @@
           <a:p>
             <a:fld id="{FF632088-7E42-4B13-8645-6CA4616862AF}" type="datetimeFigureOut">
               <a:rPr lang="en-US" smtClean="0"/>
-              <a:t>3/2/2016</a:t>
+              <a:t>3/5/2016</a:t>
             </a:fld>
             <a:endParaRPr lang="en-US"/>
           </a:p>
@@ -2404,7 +2417,7 @@
           </a:lstStyle>
           <a:p>
             <a:r>
-              <a:rPr lang="en-US" smtClean="0"/>
+              <a:rPr lang="en-US"/>
               <a:t>Click to edit Master title style</a:t>
             </a:r>
             <a:endParaRPr lang="en-US" dirty="0"/>
@@ -2433,35 +2446,35 @@
           <a:p>
             <a:pPr lvl="0"/>
             <a:r>
-              <a:rPr lang="en-US" smtClean="0"/>
+              <a:rPr lang="en-US"/>
               <a:t>Edit Master text styles</a:t>
             </a:r>
           </a:p>
           <a:p>
             <a:pPr lvl="1"/>
             <a:r>
-              <a:rPr lang="en-US" smtClean="0"/>
+              <a:rPr lang="en-US"/>
               <a:t>Second level</a:t>
             </a:r>
           </a:p>
           <a:p>
             <a:pPr lvl="2"/>
             <a:r>
-              <a:rPr lang="en-US" smtClean="0"/>
+              <a:rPr lang="en-US"/>
               <a:t>Third level</a:t>
             </a:r>
           </a:p>
           <a:p>
             <a:pPr lvl="3"/>
             <a:r>
-              <a:rPr lang="en-US" smtClean="0"/>
+              <a:rPr lang="en-US"/>
               <a:t>Fourth level</a:t>
             </a:r>
           </a:p>
           <a:p>
             <a:pPr lvl="4"/>
             <a:r>
-              <a:rPr lang="en-US" smtClean="0"/>
+              <a:rPr lang="en-US"/>
               <a:t>Fifth level</a:t>
             </a:r>
             <a:endParaRPr lang="en-US" dirty="0"/>
@@ -2527,7 +2540,7 @@
           <a:p>
             <a:pPr lvl="0"/>
             <a:r>
-              <a:rPr lang="en-US" smtClean="0"/>
+              <a:rPr lang="en-US"/>
               <a:t>Edit Master text styles</a:t>
             </a:r>
           </a:p>
@@ -2550,7 +2563,7 @@
           <a:p>
             <a:fld id="{FF632088-7E42-4B13-8645-6CA4616862AF}" type="datetimeFigureOut">
               <a:rPr lang="en-US" smtClean="0"/>
-              <a:t>3/2/2016</a:t>
+              <a:t>3/5/2016</a:t>
             </a:fld>
             <a:endParaRPr lang="en-US"/>
           </a:p>
@@ -2647,7 +2660,7 @@
   </p:clrMapOvr>
   <p:extLst>
     <p:ext uri="{DCECCB84-F9BA-43D5-87BE-67443E8EF086}">
-      <p15:sldGuideLst xmlns:p15="http://schemas.microsoft.com/office/powerpoint/2012/main" xmlns=""/>
+      <p15:sldGuideLst xmlns:p15="http://schemas.microsoft.com/office/powerpoint/2012/main"/>
     </p:ext>
   </p:extLst>
 </p:sldLayout>
@@ -2686,7 +2699,7 @@
           <a:lstStyle/>
           <a:p>
             <a:r>
-              <a:rPr lang="en-US" smtClean="0"/>
+              <a:rPr lang="en-US"/>
               <a:t>Click to edit Master title style</a:t>
             </a:r>
             <a:endParaRPr lang="en-US" dirty="0"/>
@@ -2710,35 +2723,35 @@
           <a:p>
             <a:pPr lvl="0"/>
             <a:r>
-              <a:rPr lang="en-US" smtClean="0"/>
+              <a:rPr lang="en-US"/>
               <a:t>Edit Master text styles</a:t>
             </a:r>
           </a:p>
           <a:p>
             <a:pPr lvl="1"/>
             <a:r>
-              <a:rPr lang="en-US" smtClean="0"/>
+              <a:rPr lang="en-US"/>
               <a:t>Second level</a:t>
             </a:r>
           </a:p>
           <a:p>
             <a:pPr lvl="2"/>
             <a:r>
-              <a:rPr lang="en-US" smtClean="0"/>
+              <a:rPr lang="en-US"/>
               <a:t>Third level</a:t>
             </a:r>
           </a:p>
           <a:p>
             <a:pPr lvl="3"/>
             <a:r>
-              <a:rPr lang="en-US" smtClean="0"/>
+              <a:rPr lang="en-US"/>
               <a:t>Fourth level</a:t>
             </a:r>
           </a:p>
           <a:p>
             <a:pPr lvl="4"/>
             <a:r>
-              <a:rPr lang="en-US" smtClean="0"/>
+              <a:rPr lang="en-US"/>
               <a:t>Fifth level</a:t>
             </a:r>
             <a:endParaRPr lang="en-US" dirty="0"/>
@@ -2762,7 +2775,7 @@
           <a:p>
             <a:fld id="{FF632088-7E42-4B13-8645-6CA4616862AF}" type="datetimeFigureOut">
               <a:rPr lang="en-US" smtClean="0"/>
-              <a:t>3/2/2016</a:t>
+              <a:t>3/5/2016</a:t>
             </a:fld>
             <a:endParaRPr lang="en-US"/>
           </a:p>
@@ -3005,7 +3018,7 @@
           </a:lstStyle>
           <a:p>
             <a:r>
-              <a:rPr lang="en-US" smtClean="0"/>
+              <a:rPr lang="en-US"/>
               <a:t>Click to edit Master title style</a:t>
             </a:r>
             <a:endParaRPr lang="en-US" dirty="0"/>
@@ -3080,7 +3093,7 @@
           </a:lstStyle>
           <a:p>
             <a:r>
-              <a:rPr lang="en-US" smtClean="0"/>
+              <a:rPr lang="en-US"/>
               <a:t>Click icon to add picture</a:t>
             </a:r>
             <a:endParaRPr lang="en-US" dirty="0"/>
@@ -3148,7 +3161,7 @@
           <a:p>
             <a:pPr lvl="0"/>
             <a:r>
-              <a:rPr lang="en-US" smtClean="0"/>
+              <a:rPr lang="en-US"/>
               <a:t>Edit Master text styles</a:t>
             </a:r>
           </a:p>
@@ -3180,7 +3193,7 @@
           <a:p>
             <a:fld id="{FF632088-7E42-4B13-8645-6CA4616862AF}" type="datetimeFigureOut">
               <a:rPr lang="en-US" smtClean="0"/>
-              <a:t>3/2/2016</a:t>
+              <a:t>3/5/2016</a:t>
             </a:fld>
             <a:endParaRPr lang="en-US"/>
           </a:p>
@@ -3316,7 +3329,7 @@
           <a:lstStyle/>
           <a:p>
             <a:r>
-              <a:rPr lang="en-US" smtClean="0"/>
+              <a:rPr lang="en-US"/>
               <a:t>Click to edit Master title style</a:t>
             </a:r>
             <a:endParaRPr lang="en-US" dirty="0"/>
@@ -3340,35 +3353,35 @@
           <a:p>
             <a:pPr lvl="0"/>
             <a:r>
-              <a:rPr lang="en-US" smtClean="0"/>
+              <a:rPr lang="en-US"/>
               <a:t>Edit Master text styles</a:t>
             </a:r>
           </a:p>
           <a:p>
             <a:pPr lvl="1"/>
             <a:r>
-              <a:rPr lang="en-US" smtClean="0"/>
+              <a:rPr lang="en-US"/>
               <a:t>Second level</a:t>
             </a:r>
           </a:p>
           <a:p>
             <a:pPr lvl="2"/>
             <a:r>
-              <a:rPr lang="en-US" smtClean="0"/>
+              <a:rPr lang="en-US"/>
               <a:t>Third level</a:t>
             </a:r>
           </a:p>
           <a:p>
             <a:pPr lvl="3"/>
             <a:r>
-              <a:rPr lang="en-US" smtClean="0"/>
+              <a:rPr lang="en-US"/>
               <a:t>Fourth level</a:t>
             </a:r>
           </a:p>
           <a:p>
             <a:pPr lvl="4"/>
             <a:r>
-              <a:rPr lang="en-US" smtClean="0"/>
+              <a:rPr lang="en-US"/>
               <a:t>Fifth level</a:t>
             </a:r>
             <a:endParaRPr lang="en-US" dirty="0"/>
@@ -3392,7 +3405,7 @@
           <a:p>
             <a:fld id="{FF632088-7E42-4B13-8645-6CA4616862AF}" type="datetimeFigureOut">
               <a:rPr lang="en-US" smtClean="0"/>
-              <a:t>3/2/2016</a:t>
+              <a:t>3/5/2016</a:t>
             </a:fld>
             <a:endParaRPr lang="en-US"/>
           </a:p>
@@ -3532,7 +3545,7 @@
           </a:lstStyle>
           <a:p>
             <a:r>
-              <a:rPr lang="en-US" smtClean="0"/>
+              <a:rPr lang="en-US"/>
               <a:t>Click to edit Master title style</a:t>
             </a:r>
             <a:endParaRPr lang="en-US" dirty="0"/>
@@ -3561,35 +3574,35 @@
           <a:p>
             <a:pPr lvl="0"/>
             <a:r>
-              <a:rPr lang="en-US" smtClean="0"/>
+              <a:rPr lang="en-US"/>
               <a:t>Edit Master text styles</a:t>
             </a:r>
           </a:p>
           <a:p>
             <a:pPr lvl="1"/>
             <a:r>
-              <a:rPr lang="en-US" smtClean="0"/>
+              <a:rPr lang="en-US"/>
               <a:t>Second level</a:t>
             </a:r>
           </a:p>
           <a:p>
             <a:pPr lvl="2"/>
             <a:r>
-              <a:rPr lang="en-US" smtClean="0"/>
+              <a:rPr lang="en-US"/>
               <a:t>Third level</a:t>
             </a:r>
           </a:p>
           <a:p>
             <a:pPr lvl="3"/>
             <a:r>
-              <a:rPr lang="en-US" smtClean="0"/>
+              <a:rPr lang="en-US"/>
               <a:t>Fourth level</a:t>
             </a:r>
           </a:p>
           <a:p>
             <a:pPr lvl="4"/>
             <a:r>
-              <a:rPr lang="en-US" smtClean="0"/>
+              <a:rPr lang="en-US"/>
               <a:t>Fifth level</a:t>
             </a:r>
             <a:endParaRPr lang="en-US" dirty="0"/>
@@ -3613,7 +3626,7 @@
           <a:p>
             <a:fld id="{FF632088-7E42-4B13-8645-6CA4616862AF}" type="datetimeFigureOut">
               <a:rPr lang="en-US" smtClean="0"/>
-              <a:t>3/2/2016</a:t>
+              <a:t>3/5/2016</a:t>
             </a:fld>
             <a:endParaRPr lang="en-US"/>
           </a:p>
@@ -3755,7 +3768,7 @@
           </a:lstStyle>
           <a:p>
             <a:r>
-              <a:rPr lang="en-US" smtClean="0"/>
+              <a:rPr lang="en-US"/>
               <a:t>Click to edit Master title style</a:t>
             </a:r>
             <a:endParaRPr lang="en-US" dirty="0"/>
@@ -3878,7 +3891,7 @@
           <a:p>
             <a:pPr lvl="0"/>
             <a:r>
-              <a:rPr lang="en-US" smtClean="0"/>
+              <a:rPr lang="en-US"/>
               <a:t>Edit Master text styles</a:t>
             </a:r>
           </a:p>
@@ -3901,7 +3914,7 @@
           <a:p>
             <a:fld id="{FF632088-7E42-4B13-8645-6CA4616862AF}" type="datetimeFigureOut">
               <a:rPr lang="en-US" smtClean="0"/>
-              <a:t>3/2/2016</a:t>
+              <a:t>3/5/2016</a:t>
             </a:fld>
             <a:endParaRPr lang="en-US"/>
           </a:p>
@@ -3995,7 +4008,7 @@
           <a:lstStyle/>
           <a:p>
             <a:r>
-              <a:rPr lang="en-US" smtClean="0"/>
+              <a:rPr lang="en-US"/>
               <a:t>Click to edit Master title style</a:t>
             </a:r>
             <a:endParaRPr lang="en-US" dirty="0"/>
@@ -4024,35 +4037,35 @@
           <a:p>
             <a:pPr lvl="0"/>
             <a:r>
-              <a:rPr lang="en-US" smtClean="0"/>
+              <a:rPr lang="en-US"/>
               <a:t>Edit Master text styles</a:t>
             </a:r>
           </a:p>
           <a:p>
             <a:pPr lvl="1"/>
             <a:r>
-              <a:rPr lang="en-US" smtClean="0"/>
+              <a:rPr lang="en-US"/>
               <a:t>Second level</a:t>
             </a:r>
           </a:p>
           <a:p>
             <a:pPr lvl="2"/>
             <a:r>
-              <a:rPr lang="en-US" smtClean="0"/>
+              <a:rPr lang="en-US"/>
               <a:t>Third level</a:t>
             </a:r>
           </a:p>
           <a:p>
             <a:pPr lvl="3"/>
             <a:r>
-              <a:rPr lang="en-US" smtClean="0"/>
+              <a:rPr lang="en-US"/>
               <a:t>Fourth level</a:t>
             </a:r>
           </a:p>
           <a:p>
             <a:pPr lvl="4"/>
             <a:r>
-              <a:rPr lang="en-US" smtClean="0"/>
+              <a:rPr lang="en-US"/>
               <a:t>Fifth level</a:t>
             </a:r>
             <a:endParaRPr lang="en-US" dirty="0"/>
@@ -4081,35 +4094,35 @@
           <a:p>
             <a:pPr lvl="0"/>
             <a:r>
-              <a:rPr lang="en-US" smtClean="0"/>
+              <a:rPr lang="en-US"/>
               <a:t>Edit Master text styles</a:t>
             </a:r>
           </a:p>
           <a:p>
             <a:pPr lvl="1"/>
             <a:r>
-              <a:rPr lang="en-US" smtClean="0"/>
+              <a:rPr lang="en-US"/>
               <a:t>Second level</a:t>
             </a:r>
           </a:p>
           <a:p>
             <a:pPr lvl="2"/>
             <a:r>
-              <a:rPr lang="en-US" smtClean="0"/>
+              <a:rPr lang="en-US"/>
               <a:t>Third level</a:t>
             </a:r>
           </a:p>
           <a:p>
             <a:pPr lvl="3"/>
             <a:r>
-              <a:rPr lang="en-US" smtClean="0"/>
+              <a:rPr lang="en-US"/>
               <a:t>Fourth level</a:t>
             </a:r>
           </a:p>
           <a:p>
             <a:pPr lvl="4"/>
             <a:r>
-              <a:rPr lang="en-US" smtClean="0"/>
+              <a:rPr lang="en-US"/>
               <a:t>Fifth level</a:t>
             </a:r>
             <a:endParaRPr lang="en-US" dirty="0"/>
@@ -4133,7 +4146,7 @@
           <a:p>
             <a:fld id="{FF632088-7E42-4B13-8645-6CA4616862AF}" type="datetimeFigureOut">
               <a:rPr lang="en-US" smtClean="0"/>
-              <a:t>3/2/2016</a:t>
+              <a:t>3/5/2016</a:t>
             </a:fld>
             <a:endParaRPr lang="en-US"/>
           </a:p>
@@ -4193,7 +4206,7 @@
   </p:clrMapOvr>
   <p:extLst>
     <p:ext uri="{DCECCB84-F9BA-43D5-87BE-67443E8EF086}">
-      <p15:sldGuideLst xmlns:p15="http://schemas.microsoft.com/office/powerpoint/2012/main" xmlns=""/>
+      <p15:sldGuideLst xmlns:p15="http://schemas.microsoft.com/office/powerpoint/2012/main"/>
     </p:ext>
   </p:extLst>
 </p:sldLayout>
@@ -4280,7 +4293,7 @@
           <a:p>
             <a:pPr lvl="0"/>
             <a:r>
-              <a:rPr lang="en-US" smtClean="0"/>
+              <a:rPr lang="en-US"/>
               <a:t>Edit Master text styles</a:t>
             </a:r>
           </a:p>
@@ -4308,35 +4321,35 @@
           <a:p>
             <a:pPr lvl="0"/>
             <a:r>
-              <a:rPr lang="en-US" smtClean="0"/>
+              <a:rPr lang="en-US"/>
               <a:t>Edit Master text styles</a:t>
             </a:r>
           </a:p>
           <a:p>
             <a:pPr lvl="1"/>
             <a:r>
-              <a:rPr lang="en-US" smtClean="0"/>
+              <a:rPr lang="en-US"/>
               <a:t>Second level</a:t>
             </a:r>
           </a:p>
           <a:p>
             <a:pPr lvl="2"/>
             <a:r>
-              <a:rPr lang="en-US" smtClean="0"/>
+              <a:rPr lang="en-US"/>
               <a:t>Third level</a:t>
             </a:r>
           </a:p>
           <a:p>
             <a:pPr lvl="3"/>
             <a:r>
-              <a:rPr lang="en-US" smtClean="0"/>
+              <a:rPr lang="en-US"/>
               <a:t>Fourth level</a:t>
             </a:r>
           </a:p>
           <a:p>
             <a:pPr lvl="4"/>
             <a:r>
-              <a:rPr lang="en-US" smtClean="0"/>
+              <a:rPr lang="en-US"/>
               <a:t>Fifth level</a:t>
             </a:r>
             <a:endParaRPr lang="en-US" dirty="0"/>
@@ -4405,7 +4418,7 @@
           <a:p>
             <a:pPr lvl="0"/>
             <a:r>
-              <a:rPr lang="en-US" smtClean="0"/>
+              <a:rPr lang="en-US"/>
               <a:t>Edit Master text styles</a:t>
             </a:r>
           </a:p>
@@ -4433,38 +4446,37 @@
           <a:p>
             <a:pPr lvl="0"/>
             <a:r>
-              <a:rPr lang="en-US" smtClean="0"/>
+              <a:rPr lang="en-US"/>
               <a:t>Edit Master text styles</a:t>
             </a:r>
           </a:p>
           <a:p>
             <a:pPr lvl="1"/>
             <a:r>
-              <a:rPr lang="en-US" smtClean="0"/>
+              <a:rPr lang="en-US"/>
               <a:t>Second level</a:t>
             </a:r>
           </a:p>
           <a:p>
             <a:pPr lvl="2"/>
             <a:r>
-              <a:rPr lang="en-US" smtClean="0"/>
+              <a:rPr lang="en-US"/>
               <a:t>Third level</a:t>
             </a:r>
           </a:p>
           <a:p>
             <a:pPr lvl="3"/>
             <a:r>
-              <a:rPr lang="en-US" smtClean="0"/>
+              <a:rPr lang="en-US"/>
               <a:t>Fourth level</a:t>
             </a:r>
           </a:p>
           <a:p>
             <a:pPr lvl="4"/>
             <a:r>
-              <a:rPr lang="en-US" smtClean="0"/>
+              <a:rPr lang="en-US"/>
               <a:t>Fifth level</a:t>
             </a:r>
-            <a:endParaRPr lang="en-US"/>
           </a:p>
         </p:txBody>
       </p:sp>
@@ -4485,7 +4497,7 @@
           <a:p>
             <a:fld id="{FF632088-7E42-4B13-8645-6CA4616862AF}" type="datetimeFigureOut">
               <a:rPr lang="en-US" smtClean="0"/>
-              <a:t>3/2/2016</a:t>
+              <a:t>3/5/2016</a:t>
             </a:fld>
             <a:endParaRPr lang="en-US"/>
           </a:p>
@@ -4549,7 +4561,7 @@
           <a:lstStyle/>
           <a:p>
             <a:r>
-              <a:rPr lang="en-US" smtClean="0"/>
+              <a:rPr lang="en-US"/>
               <a:t>Click to edit Master title style</a:t>
             </a:r>
             <a:endParaRPr lang="en-US" dirty="0"/>
@@ -4568,7 +4580,7 @@
   </p:clrMapOvr>
   <p:extLst>
     <p:ext uri="{DCECCB84-F9BA-43D5-87BE-67443E8EF086}">
-      <p15:sldGuideLst xmlns:p15="http://schemas.microsoft.com/office/powerpoint/2012/main" xmlns=""/>
+      <p15:sldGuideLst xmlns:p15="http://schemas.microsoft.com/office/powerpoint/2012/main"/>
     </p:ext>
   </p:extLst>
 </p:sldLayout>
@@ -4608,7 +4620,7 @@
           <a:p>
             <a:fld id="{FF632088-7E42-4B13-8645-6CA4616862AF}" type="datetimeFigureOut">
               <a:rPr lang="en-US" smtClean="0"/>
-              <a:t>3/2/2016</a:t>
+              <a:t>3/5/2016</a:t>
             </a:fld>
             <a:endParaRPr lang="en-US"/>
           </a:p>
@@ -4672,10 +4684,9 @@
           <a:lstStyle/>
           <a:p>
             <a:r>
-              <a:rPr lang="en-US" smtClean="0"/>
+              <a:rPr lang="en-US"/>
               <a:t>Click to edit Master title style</a:t>
             </a:r>
-            <a:endParaRPr lang="en-US"/>
           </a:p>
         </p:txBody>
       </p:sp>
@@ -4726,7 +4737,7 @@
           <a:p>
             <a:fld id="{FF632088-7E42-4B13-8645-6CA4616862AF}" type="datetimeFigureOut">
               <a:rPr lang="en-US" smtClean="0"/>
-              <a:t>3/2/2016</a:t>
+              <a:t>3/5/2016</a:t>
             </a:fld>
             <a:endParaRPr lang="en-US"/>
           </a:p>
@@ -4831,7 +4842,7 @@
           </a:lstStyle>
           <a:p>
             <a:r>
-              <a:rPr lang="en-US" smtClean="0"/>
+              <a:rPr lang="en-US"/>
               <a:t>Click to edit Master title style</a:t>
             </a:r>
             <a:endParaRPr lang="en-US" dirty="0"/>
@@ -4888,35 +4899,35 @@
           <a:p>
             <a:pPr lvl="0"/>
             <a:r>
-              <a:rPr lang="en-US" smtClean="0"/>
+              <a:rPr lang="en-US"/>
               <a:t>Edit Master text styles</a:t>
             </a:r>
           </a:p>
           <a:p>
             <a:pPr lvl="1"/>
             <a:r>
-              <a:rPr lang="en-US" smtClean="0"/>
+              <a:rPr lang="en-US"/>
               <a:t>Second level</a:t>
             </a:r>
           </a:p>
           <a:p>
             <a:pPr lvl="2"/>
             <a:r>
-              <a:rPr lang="en-US" smtClean="0"/>
+              <a:rPr lang="en-US"/>
               <a:t>Third level</a:t>
             </a:r>
           </a:p>
           <a:p>
             <a:pPr lvl="3"/>
             <a:r>
-              <a:rPr lang="en-US" smtClean="0"/>
+              <a:rPr lang="en-US"/>
               <a:t>Fourth level</a:t>
             </a:r>
           </a:p>
           <a:p>
             <a:pPr lvl="4"/>
             <a:r>
-              <a:rPr lang="en-US" smtClean="0"/>
+              <a:rPr lang="en-US"/>
               <a:t>Fifth level</a:t>
             </a:r>
             <a:endParaRPr lang="en-US" dirty="0"/>
@@ -4987,7 +4998,7 @@
           <a:p>
             <a:pPr lvl="0"/>
             <a:r>
-              <a:rPr lang="en-US" smtClean="0"/>
+              <a:rPr lang="en-US"/>
               <a:t>Edit Master text styles</a:t>
             </a:r>
           </a:p>
@@ -5010,7 +5021,7 @@
           <a:p>
             <a:fld id="{FF632088-7E42-4B13-8645-6CA4616862AF}" type="datetimeFigureOut">
               <a:rPr lang="en-US" smtClean="0"/>
-              <a:t>3/2/2016</a:t>
+              <a:t>3/5/2016</a:t>
             </a:fld>
             <a:endParaRPr lang="en-US"/>
           </a:p>
@@ -5070,7 +5081,7 @@
   </p:clrMapOvr>
   <p:extLst>
     <p:ext uri="{DCECCB84-F9BA-43D5-87BE-67443E8EF086}">
-      <p15:sldGuideLst xmlns:p15="http://schemas.microsoft.com/office/powerpoint/2012/main" xmlns=""/>
+      <p15:sldGuideLst xmlns:p15="http://schemas.microsoft.com/office/powerpoint/2012/main"/>
     </p:ext>
   </p:extLst>
 </p:sldLayout>
@@ -5120,7 +5131,7 @@
           </a:lstStyle>
           <a:p>
             <a:r>
-              <a:rPr lang="en-US" smtClean="0"/>
+              <a:rPr lang="en-US"/>
               <a:t>Click to edit Master title style</a:t>
             </a:r>
             <a:endParaRPr lang="en-US" dirty="0"/>
@@ -5185,7 +5196,7 @@
           </a:lstStyle>
           <a:p>
             <a:r>
-              <a:rPr lang="en-US" smtClean="0"/>
+              <a:rPr lang="en-US"/>
               <a:t>Click icon to add picture</a:t>
             </a:r>
             <a:endParaRPr lang="en-US" dirty="0"/>
@@ -5256,7 +5267,7 @@
           <a:p>
             <a:pPr lvl="0"/>
             <a:r>
-              <a:rPr lang="en-US" smtClean="0"/>
+              <a:rPr lang="en-US"/>
               <a:t>Edit Master text styles</a:t>
             </a:r>
           </a:p>
@@ -5279,7 +5290,7 @@
           <a:p>
             <a:fld id="{FF632088-7E42-4B13-8645-6CA4616862AF}" type="datetimeFigureOut">
               <a:rPr lang="en-US" smtClean="0"/>
-              <a:t>3/2/2016</a:t>
+              <a:t>3/5/2016</a:t>
             </a:fld>
             <a:endParaRPr lang="en-US"/>
           </a:p>
@@ -5388,7 +5399,7 @@
           <a:lstStyle/>
           <a:p>
             <a:r>
-              <a:rPr lang="en-US" smtClean="0"/>
+              <a:rPr lang="en-US"/>
               <a:t>Click to edit Master title style</a:t>
             </a:r>
             <a:endParaRPr lang="en-US" dirty="0"/>
@@ -5422,35 +5433,35 @@
           <a:p>
             <a:pPr lvl="0"/>
             <a:r>
-              <a:rPr lang="en-US" smtClean="0"/>
+              <a:rPr lang="en-US"/>
               <a:t>Edit Master text styles</a:t>
             </a:r>
           </a:p>
           <a:p>
             <a:pPr lvl="1"/>
             <a:r>
-              <a:rPr lang="en-US" smtClean="0"/>
+              <a:rPr lang="en-US"/>
               <a:t>Second level</a:t>
             </a:r>
           </a:p>
           <a:p>
             <a:pPr lvl="2"/>
             <a:r>
-              <a:rPr lang="en-US" smtClean="0"/>
+              <a:rPr lang="en-US"/>
               <a:t>Third level</a:t>
             </a:r>
           </a:p>
           <a:p>
             <a:pPr lvl="3"/>
             <a:r>
-              <a:rPr lang="en-US" smtClean="0"/>
+              <a:rPr lang="en-US"/>
               <a:t>Fourth level</a:t>
             </a:r>
           </a:p>
           <a:p>
             <a:pPr lvl="4"/>
             <a:r>
-              <a:rPr lang="en-US" smtClean="0"/>
+              <a:rPr lang="en-US"/>
               <a:t>Fifth level</a:t>
             </a:r>
             <a:endParaRPr lang="en-US" dirty="0"/>
@@ -5493,7 +5504,7 @@
           <a:p>
             <a:fld id="{FF632088-7E42-4B13-8645-6CA4616862AF}" type="datetimeFigureOut">
               <a:rPr lang="en-US" smtClean="0"/>
-              <a:t>3/2/2016</a:t>
+              <a:t>3/5/2016</a:t>
             </a:fld>
             <a:endParaRPr lang="en-US"/>
           </a:p>
@@ -5869,7 +5880,7 @@
   </p:txStyles>
   <p:extLst>
     <p:ext uri="{27BBF7A9-308A-43DC-89C8-2F10F3537804}">
-      <p15:sldGuideLst xmlns:p15="http://schemas.microsoft.com/office/powerpoint/2012/main" xmlns=""/>
+      <p15:sldGuideLst xmlns:p15="http://schemas.microsoft.com/office/powerpoint/2012/main"/>
     </p:ext>
   </p:extLst>
 </p:sldMaster>
@@ -5995,7 +6006,7 @@
           <a:lstStyle/>
           <a:p>
             <a:r>
-              <a:rPr lang="en-US" smtClean="0"/>
+              <a:rPr lang="en-US"/>
               <a:t>Click to edit Master title style</a:t>
             </a:r>
             <a:endParaRPr lang="en-US" dirty="0"/>
@@ -6098,7 +6109,7 @@
           <a:p>
             <a:fld id="{FF632088-7E42-4B13-8645-6CA4616862AF}" type="datetimeFigureOut">
               <a:rPr lang="en-US" smtClean="0"/>
-              <a:t>3/2/2016</a:t>
+              <a:t>3/5/2016</a:t>
             </a:fld>
             <a:endParaRPr lang="en-US"/>
           </a:p>
@@ -6566,7 +6577,7 @@
   </p:txStyles>
   <p:extLst>
     <p:ext uri="{27BBF7A9-308A-43DC-89C8-2F10F3537804}">
-      <p15:sldGuideLst xmlns:p15="http://schemas.microsoft.com/office/powerpoint/2012/main" xmlns=""/>
+      <p15:sldGuideLst xmlns:p15="http://schemas.microsoft.com/office/powerpoint/2012/main"/>
     </p:ext>
   </p:extLst>
 </p:sldMaster>
@@ -6607,17 +6618,16 @@
           <a:lstStyle/>
           <a:p>
             <a:r>
-              <a:rPr lang="en-US" dirty="0" smtClean="0"/>
+              <a:rPr lang="en-US" dirty="0"/>
               <a:t>Procedure Codes </a:t>
             </a:r>
             <a:br>
-              <a:rPr lang="en-US" dirty="0" smtClean="0"/>
+              <a:rPr lang="en-US" dirty="0"/>
             </a:br>
             <a:r>
-              <a:rPr lang="en-US" dirty="0" smtClean="0"/>
+              <a:rPr lang="en-US" dirty="0"/>
               <a:t>&amp; Revenue Codes</a:t>
             </a:r>
-            <a:endParaRPr lang="en-US" dirty="0"/>
           </a:p>
         </p:txBody>
       </p:sp>
@@ -6637,13 +6647,45 @@
           <a:lstStyle/>
           <a:p>
             <a:r>
-              <a:rPr lang="en-US" smtClean="0"/>
+              <a:rPr lang="en-US"/>
               <a:t>Spyridon Ganas</a:t>
             </a:r>
-            <a:endParaRPr lang="en-US"/>
-          </a:p>
-        </p:txBody>
-      </p:sp>
+          </a:p>
+        </p:txBody>
+      </p:sp>
+      <p:pic>
+        <p:nvPicPr>
+          <p:cNvPr id="5" name="Audio 4">
+            <a:hlinkClick r:id="" action="ppaction://media"/>
+          </p:cNvPr>
+          <p:cNvPicPr>
+            <a:picLocks noChangeAspect="1"/>
+          </p:cNvPicPr>
+          <p:nvPr>
+            <a:audioFile r:link="rId2"/>
+            <p:extLst>
+              <p:ext uri="{DAA4B4D4-6D71-4841-9C94-3DE7FCFB9230}">
+                <p14:media xmlns:p14="http://schemas.microsoft.com/office/powerpoint/2010/main" r:embed="rId1"/>
+              </p:ext>
+            </p:extLst>
+          </p:nvPr>
+        </p:nvPicPr>
+        <p:blipFill>
+          <a:blip r:embed="rId4"/>
+          <a:stretch>
+            <a:fillRect/>
+          </a:stretch>
+        </p:blipFill>
+        <p:spPr>
+          <a:xfrm>
+            <a:off x="12670077" y="6033370"/>
+            <a:ext cx="609600" cy="609600"/>
+          </a:xfrm>
+          <a:prstGeom prst="rect">
+            <a:avLst/>
+          </a:prstGeom>
+        </p:spPr>
+      </p:pic>
     </p:spTree>
     <p:extLst>
       <p:ext uri="{BB962C8B-B14F-4D97-AF65-F5344CB8AC3E}">
@@ -6654,6 +6696,101 @@
   <p:clrMapOvr>
     <a:masterClrMapping/>
   </p:clrMapOvr>
+  <mc:AlternateContent xmlns:mc="http://schemas.openxmlformats.org/markup-compatibility/2006">
+    <mc:Choice xmlns:p14="http://schemas.microsoft.com/office/powerpoint/2010/main" Requires="p14">
+      <p:transition spd="slow" p14:dur="2000" advTm="12485"/>
+    </mc:Choice>
+    <mc:Fallback>
+      <p:transition spd="slow" advTm="12485"/>
+    </mc:Fallback>
+  </mc:AlternateContent>
+  <p:timing>
+    <p:tnLst>
+      <p:par>
+        <p:cTn id="1" dur="indefinite" restart="never" nodeType="tmRoot">
+          <p:childTnLst>
+            <p:seq concurrent="1" nextAc="seek">
+              <p:cTn id="2" dur="indefinite" nodeType="mainSeq">
+                <p:childTnLst>
+                  <p:par>
+                    <p:cTn id="3" fill="hold">
+                      <p:stCondLst>
+                        <p:cond delay="indefinite"/>
+                        <p:cond evt="onBegin" delay="0">
+                          <p:tn val="2"/>
+                        </p:cond>
+                      </p:stCondLst>
+                      <p:childTnLst>
+                        <p:par>
+                          <p:cTn id="4" fill="hold">
+                            <p:stCondLst>
+                              <p:cond delay="0"/>
+                            </p:stCondLst>
+                            <p:childTnLst>
+                              <p:par>
+                                <p:cTn id="5" presetID="1" presetClass="mediacall" presetSubtype="0" fill="hold" nodeType="afterEffect">
+                                  <p:stCondLst>
+                                    <p:cond delay="0"/>
+                                  </p:stCondLst>
+                                  <p:childTnLst>
+                                    <p:cmd type="call" cmd="playFrom(0.0)">
+                                      <p:cBhvr>
+                                        <p:cTn id="6" dur="1" fill="hold"/>
+                                        <p:tgtEl>
+                                          <p:spTgt spid="5"/>
+                                        </p:tgtEl>
+                                      </p:cBhvr>
+                                    </p:cmd>
+                                  </p:childTnLst>
+                                </p:cTn>
+                              </p:par>
+                            </p:childTnLst>
+                          </p:cTn>
+                        </p:par>
+                      </p:childTnLst>
+                    </p:cTn>
+                  </p:par>
+                </p:childTnLst>
+              </p:cTn>
+              <p:prevCondLst>
+                <p:cond evt="onPrev" delay="0">
+                  <p:tgtEl>
+                    <p:sldTgt/>
+                  </p:tgtEl>
+                </p:cond>
+              </p:prevCondLst>
+              <p:nextCondLst>
+                <p:cond evt="onNext" delay="0">
+                  <p:tgtEl>
+                    <p:sldTgt/>
+                  </p:tgtEl>
+                </p:cond>
+              </p:nextCondLst>
+            </p:seq>
+            <p:audio isNarration="1">
+              <p:cMediaNode vol="80000" showWhenStopped="0">
+                <p:cTn id="7" fill="hold" display="0">
+                  <p:stCondLst>
+                    <p:cond delay="indefinite"/>
+                  </p:stCondLst>
+                  <p:endCondLst>
+                    <p:cond evt="onStopAudio" delay="0">
+                      <p:tgtEl>
+                        <p:sldTgt/>
+                      </p:tgtEl>
+                    </p:cond>
+                  </p:endCondLst>
+                </p:cTn>
+                <p:tgtEl>
+                  <p:spTgt spid="5"/>
+                </p:tgtEl>
+              </p:cMediaNode>
+            </p:audio>
+          </p:childTnLst>
+        </p:cTn>
+      </p:par>
+    </p:tnLst>
+  </p:timing>
 </p:sld>
 </file>
 
@@ -6690,10 +6827,9 @@
           <a:lstStyle/>
           <a:p>
             <a:r>
-              <a:rPr lang="en-US" dirty="0" smtClean="0"/>
+              <a:rPr lang="en-US" dirty="0"/>
               <a:t>CPT Codes</a:t>
             </a:r>
-            <a:endParaRPr lang="en-US" dirty="0"/>
           </a:p>
         </p:txBody>
       </p:sp>
@@ -6713,54 +6849,78 @@
           <a:lstStyle/>
           <a:p>
             <a:r>
-              <a:rPr lang="en-US" dirty="0" smtClean="0"/>
+              <a:rPr lang="en-US" dirty="0"/>
               <a:t>Current Procedural Terminology (CPT) codes identify medical procedures</a:t>
             </a:r>
           </a:p>
           <a:p>
             <a:r>
-              <a:rPr lang="en-US" dirty="0" smtClean="0"/>
+              <a:rPr lang="en-US" dirty="0"/>
               <a:t>CPT codes are maintained (and copyrighted) by the American Medical Association </a:t>
             </a:r>
           </a:p>
           <a:p>
             <a:r>
-              <a:rPr lang="en-US" dirty="0" smtClean="0"/>
+              <a:rPr lang="en-US" dirty="0"/>
               <a:t>Three types of CPT Codes:</a:t>
             </a:r>
           </a:p>
           <a:p>
             <a:pPr lvl="1"/>
             <a:r>
-              <a:rPr lang="en-US" dirty="0" smtClean="0"/>
+              <a:rPr lang="en-US" dirty="0"/>
               <a:t>Category 1:  commonly-used billable procedures</a:t>
             </a:r>
           </a:p>
           <a:p>
             <a:pPr lvl="1"/>
             <a:r>
-              <a:rPr lang="en-US" dirty="0" smtClean="0"/>
-              <a:t>Category 2:  non-billable codes used to describe patient history, interventions, </a:t>
-            </a:r>
-            <a:r>
-              <a:rPr lang="en-US" dirty="0" err="1" smtClean="0"/>
-              <a:t>resulta</a:t>
-            </a:r>
-            <a:r>
-              <a:rPr lang="en-US" dirty="0" smtClean="0"/>
-              <a:t> and quality metrics.</a:t>
+              <a:rPr lang="en-US" dirty="0"/>
+              <a:t>Category 2:  non-billable codes used to describe patient history, interventions, laboratory results and quality metrics.</a:t>
             </a:r>
           </a:p>
           <a:p>
             <a:pPr lvl="1"/>
             <a:r>
-              <a:rPr lang="en-US" dirty="0" smtClean="0"/>
+              <a:rPr lang="en-US" dirty="0"/>
               <a:t>Category 3:  Emerging technologies</a:t>
             </a:r>
-            <a:endParaRPr lang="en-US" dirty="0"/>
-          </a:p>
-        </p:txBody>
-      </p:sp>
+          </a:p>
+        </p:txBody>
+      </p:sp>
+      <p:pic>
+        <p:nvPicPr>
+          <p:cNvPr id="5" name="Audio 4">
+            <a:hlinkClick r:id="" action="ppaction://media"/>
+          </p:cNvPr>
+          <p:cNvPicPr>
+            <a:picLocks noChangeAspect="1"/>
+          </p:cNvPicPr>
+          <p:nvPr>
+            <a:audioFile r:link="rId2"/>
+            <p:extLst>
+              <p:ext uri="{DAA4B4D4-6D71-4841-9C94-3DE7FCFB9230}">
+                <p14:media xmlns:p14="http://schemas.microsoft.com/office/powerpoint/2010/main" r:embed="rId1"/>
+              </p:ext>
+            </p:extLst>
+          </p:nvPr>
+        </p:nvPicPr>
+        <p:blipFill>
+          <a:blip r:embed="rId4"/>
+          <a:stretch>
+            <a:fillRect/>
+          </a:stretch>
+        </p:blipFill>
+        <p:spPr>
+          <a:xfrm>
+            <a:off x="13684685" y="5820428"/>
+            <a:ext cx="609600" cy="609600"/>
+          </a:xfrm>
+          <a:prstGeom prst="rect">
+            <a:avLst/>
+          </a:prstGeom>
+        </p:spPr>
+      </p:pic>
     </p:spTree>
     <p:extLst>
       <p:ext uri="{BB962C8B-B14F-4D97-AF65-F5344CB8AC3E}">
@@ -6771,6 +6931,101 @@
   <p:clrMapOvr>
     <a:masterClrMapping/>
   </p:clrMapOvr>
+  <mc:AlternateContent xmlns:mc="http://schemas.openxmlformats.org/markup-compatibility/2006">
+    <mc:Choice xmlns:p14="http://schemas.microsoft.com/office/powerpoint/2010/main" Requires="p14">
+      <p:transition spd="slow" p14:dur="2000" advTm="41223"/>
+    </mc:Choice>
+    <mc:Fallback>
+      <p:transition spd="slow" advTm="41223"/>
+    </mc:Fallback>
+  </mc:AlternateContent>
+  <p:timing>
+    <p:tnLst>
+      <p:par>
+        <p:cTn id="1" dur="indefinite" restart="never" nodeType="tmRoot">
+          <p:childTnLst>
+            <p:seq concurrent="1" nextAc="seek">
+              <p:cTn id="2" dur="indefinite" nodeType="mainSeq">
+                <p:childTnLst>
+                  <p:par>
+                    <p:cTn id="3" fill="hold">
+                      <p:stCondLst>
+                        <p:cond delay="indefinite"/>
+                        <p:cond evt="onBegin" delay="0">
+                          <p:tn val="2"/>
+                        </p:cond>
+                      </p:stCondLst>
+                      <p:childTnLst>
+                        <p:par>
+                          <p:cTn id="4" fill="hold">
+                            <p:stCondLst>
+                              <p:cond delay="0"/>
+                            </p:stCondLst>
+                            <p:childTnLst>
+                              <p:par>
+                                <p:cTn id="5" presetID="1" presetClass="mediacall" presetSubtype="0" fill="hold" nodeType="afterEffect">
+                                  <p:stCondLst>
+                                    <p:cond delay="0"/>
+                                  </p:stCondLst>
+                                  <p:childTnLst>
+                                    <p:cmd type="call" cmd="playFrom(0.0)">
+                                      <p:cBhvr>
+                                        <p:cTn id="6" dur="1" fill="hold"/>
+                                        <p:tgtEl>
+                                          <p:spTgt spid="5"/>
+                                        </p:tgtEl>
+                                      </p:cBhvr>
+                                    </p:cmd>
+                                  </p:childTnLst>
+                                </p:cTn>
+                              </p:par>
+                            </p:childTnLst>
+                          </p:cTn>
+                        </p:par>
+                      </p:childTnLst>
+                    </p:cTn>
+                  </p:par>
+                </p:childTnLst>
+              </p:cTn>
+              <p:prevCondLst>
+                <p:cond evt="onPrev" delay="0">
+                  <p:tgtEl>
+                    <p:sldTgt/>
+                  </p:tgtEl>
+                </p:cond>
+              </p:prevCondLst>
+              <p:nextCondLst>
+                <p:cond evt="onNext" delay="0">
+                  <p:tgtEl>
+                    <p:sldTgt/>
+                  </p:tgtEl>
+                </p:cond>
+              </p:nextCondLst>
+            </p:seq>
+            <p:audio isNarration="1">
+              <p:cMediaNode vol="80000" showWhenStopped="0">
+                <p:cTn id="7" fill="hold" display="0">
+                  <p:stCondLst>
+                    <p:cond delay="indefinite"/>
+                  </p:stCondLst>
+                  <p:endCondLst>
+                    <p:cond evt="onStopAudio" delay="0">
+                      <p:tgtEl>
+                        <p:sldTgt/>
+                      </p:tgtEl>
+                    </p:cond>
+                  </p:endCondLst>
+                </p:cTn>
+                <p:tgtEl>
+                  <p:spTgt spid="5"/>
+                </p:tgtEl>
+              </p:cMediaNode>
+            </p:audio>
+          </p:childTnLst>
+        </p:cTn>
+      </p:par>
+    </p:tnLst>
+  </p:timing>
 </p:sld>
 </file>
 
@@ -6807,10 +7062,9 @@
           <a:lstStyle/>
           <a:p>
             <a:r>
-              <a:rPr lang="en-US" dirty="0" smtClean="0"/>
+              <a:rPr lang="en-US" dirty="0"/>
               <a:t>HCPCS Codes</a:t>
             </a:r>
-            <a:endParaRPr lang="en-US" dirty="0"/>
           </a:p>
         </p:txBody>
       </p:sp>
@@ -6830,48 +7084,72 @@
           <a:lstStyle/>
           <a:p>
             <a:r>
-              <a:rPr lang="en-US" dirty="0" smtClean="0"/>
-              <a:t>“Hick Picks”, the Healthcare Common Procedure coding System (HCPCS) is a coding system developed by the Center for Medicare and Medicaid Services.</a:t>
-            </a:r>
-          </a:p>
-          <a:p>
-            <a:r>
-              <a:rPr lang="en-US" dirty="0" smtClean="0"/>
+              <a:rPr lang="en-US" dirty="0"/>
+              <a:t>“Hick Picks”, the Healthcare Common Procedure Coding System (HCPCS) is a coding system developed by the Center for Medicare and Medicaid Services.</a:t>
+            </a:r>
+          </a:p>
+          <a:p>
+            <a:r>
+              <a:rPr lang="en-US" dirty="0"/>
               <a:t>There are three levels of HCPCS codes:</a:t>
             </a:r>
           </a:p>
           <a:p>
             <a:pPr lvl="1"/>
             <a:r>
-              <a:rPr lang="en-US" dirty="0" smtClean="0"/>
-              <a:t>Level 1</a:t>
-            </a:r>
-            <a:r>
-              <a:rPr lang="en-US" smtClean="0"/>
-              <a:t>:  Consist </a:t>
-            </a:r>
-            <a:r>
-              <a:rPr lang="en-US" dirty="0" smtClean="0"/>
-              <a:t>of the CPT codes</a:t>
+              <a:rPr lang="en-US" dirty="0"/>
+              <a:t>Level 1:  Consist of the CPT codes</a:t>
             </a:r>
           </a:p>
           <a:p>
             <a:pPr lvl="1"/>
             <a:r>
-              <a:rPr lang="en-US" dirty="0" smtClean="0"/>
+              <a:rPr lang="en-US" dirty="0"/>
               <a:t>Level 2: Records non-physician services and supplies.  These codes cover durable medical good, ambulance transportation, rehabilitation services, etc.</a:t>
             </a:r>
           </a:p>
           <a:p>
             <a:pPr lvl="1"/>
             <a:r>
-              <a:rPr lang="en-US" dirty="0" smtClean="0"/>
+              <a:rPr lang="en-US" dirty="0"/>
               <a:t>Level 3: No longer used, level 3 codes allowed state Medicaid agencies to develop custom codes.</a:t>
             </a:r>
-            <a:endParaRPr lang="en-US" dirty="0"/>
-          </a:p>
-        </p:txBody>
-      </p:sp>
+          </a:p>
+        </p:txBody>
+      </p:sp>
+      <p:pic>
+        <p:nvPicPr>
+          <p:cNvPr id="4" name="Audio 3">
+            <a:hlinkClick r:id="" action="ppaction://media"/>
+          </p:cNvPr>
+          <p:cNvPicPr>
+            <a:picLocks noChangeAspect="1"/>
+          </p:cNvPicPr>
+          <p:nvPr>
+            <a:audioFile r:link="rId2"/>
+            <p:extLst>
+              <p:ext uri="{DAA4B4D4-6D71-4841-9C94-3DE7FCFB9230}">
+                <p14:media xmlns:p14="http://schemas.microsoft.com/office/powerpoint/2010/main" r:embed="rId1"/>
+              </p:ext>
+            </p:extLst>
+          </p:nvPr>
+        </p:nvPicPr>
+        <p:blipFill>
+          <a:blip r:embed="rId4"/>
+          <a:stretch>
+            <a:fillRect/>
+          </a:stretch>
+        </p:blipFill>
+        <p:spPr>
+          <a:xfrm>
+            <a:off x="12958176" y="5958213"/>
+            <a:ext cx="609600" cy="609600"/>
+          </a:xfrm>
+          <a:prstGeom prst="rect">
+            <a:avLst/>
+          </a:prstGeom>
+        </p:spPr>
+      </p:pic>
     </p:spTree>
     <p:extLst>
       <p:ext uri="{BB962C8B-B14F-4D97-AF65-F5344CB8AC3E}">
@@ -6882,6 +7160,101 @@
   <p:clrMapOvr>
     <a:masterClrMapping/>
   </p:clrMapOvr>
+  <mc:AlternateContent xmlns:mc="http://schemas.openxmlformats.org/markup-compatibility/2006">
+    <mc:Choice xmlns:p14="http://schemas.microsoft.com/office/powerpoint/2010/main" Requires="p14">
+      <p:transition spd="slow" p14:dur="2000" advTm="37723"/>
+    </mc:Choice>
+    <mc:Fallback>
+      <p:transition spd="slow" advTm="37723"/>
+    </mc:Fallback>
+  </mc:AlternateContent>
+  <p:timing>
+    <p:tnLst>
+      <p:par>
+        <p:cTn id="1" dur="indefinite" restart="never" nodeType="tmRoot">
+          <p:childTnLst>
+            <p:seq concurrent="1" nextAc="seek">
+              <p:cTn id="2" dur="indefinite" nodeType="mainSeq">
+                <p:childTnLst>
+                  <p:par>
+                    <p:cTn id="3" fill="hold">
+                      <p:stCondLst>
+                        <p:cond delay="indefinite"/>
+                        <p:cond evt="onBegin" delay="0">
+                          <p:tn val="2"/>
+                        </p:cond>
+                      </p:stCondLst>
+                      <p:childTnLst>
+                        <p:par>
+                          <p:cTn id="4" fill="hold">
+                            <p:stCondLst>
+                              <p:cond delay="0"/>
+                            </p:stCondLst>
+                            <p:childTnLst>
+                              <p:par>
+                                <p:cTn id="5" presetID="1" presetClass="mediacall" presetSubtype="0" fill="hold" nodeType="afterEffect">
+                                  <p:stCondLst>
+                                    <p:cond delay="0"/>
+                                  </p:stCondLst>
+                                  <p:childTnLst>
+                                    <p:cmd type="call" cmd="playFrom(0.0)">
+                                      <p:cBhvr>
+                                        <p:cTn id="6" dur="1" fill="hold"/>
+                                        <p:tgtEl>
+                                          <p:spTgt spid="4"/>
+                                        </p:tgtEl>
+                                      </p:cBhvr>
+                                    </p:cmd>
+                                  </p:childTnLst>
+                                </p:cTn>
+                              </p:par>
+                            </p:childTnLst>
+                          </p:cTn>
+                        </p:par>
+                      </p:childTnLst>
+                    </p:cTn>
+                  </p:par>
+                </p:childTnLst>
+              </p:cTn>
+              <p:prevCondLst>
+                <p:cond evt="onPrev" delay="0">
+                  <p:tgtEl>
+                    <p:sldTgt/>
+                  </p:tgtEl>
+                </p:cond>
+              </p:prevCondLst>
+              <p:nextCondLst>
+                <p:cond evt="onNext" delay="0">
+                  <p:tgtEl>
+                    <p:sldTgt/>
+                  </p:tgtEl>
+                </p:cond>
+              </p:nextCondLst>
+            </p:seq>
+            <p:audio isNarration="1">
+              <p:cMediaNode vol="80000" showWhenStopped="0">
+                <p:cTn id="7" fill="hold" display="0">
+                  <p:stCondLst>
+                    <p:cond delay="indefinite"/>
+                  </p:stCondLst>
+                  <p:endCondLst>
+                    <p:cond evt="onStopAudio" delay="0">
+                      <p:tgtEl>
+                        <p:sldTgt/>
+                      </p:tgtEl>
+                    </p:cond>
+                  </p:endCondLst>
+                </p:cTn>
+                <p:tgtEl>
+                  <p:spTgt spid="4"/>
+                </p:tgtEl>
+              </p:cMediaNode>
+            </p:audio>
+          </p:childTnLst>
+        </p:cTn>
+      </p:par>
+    </p:tnLst>
+  </p:timing>
 </p:sld>
 </file>
 
@@ -6918,10 +7291,9 @@
           <a:lstStyle/>
           <a:p>
             <a:r>
-              <a:rPr lang="en-US" dirty="0" smtClean="0"/>
+              <a:rPr lang="en-US" dirty="0"/>
               <a:t>Revenue Codes</a:t>
             </a:r>
-            <a:endParaRPr lang="en-US" dirty="0"/>
           </a:p>
         </p:txBody>
       </p:sp>
@@ -6948,47 +7320,72 @@
           <a:lstStyle/>
           <a:p>
             <a:r>
-              <a:rPr lang="en-US" dirty="0" smtClean="0"/>
-              <a:t>Revenue codes are four-digit numbers that provide additional details about a medi</a:t>
-            </a:r>
-            <a:r>
-              <a:rPr lang="en-US" dirty="0" smtClean="0"/>
-              <a:t>cal service</a:t>
+              <a:rPr lang="en-US" dirty="0"/>
+              <a:t>Revenue codes are four-digit numbers that provide additional details about a medical service</a:t>
             </a:r>
           </a:p>
           <a:p>
             <a:pPr lvl="1"/>
             <a:r>
-              <a:rPr lang="en-US" dirty="0" smtClean="0"/>
+              <a:rPr lang="en-US" dirty="0"/>
               <a:t>Type of room – private, two-person, sterile environment, etc.</a:t>
             </a:r>
           </a:p>
           <a:p>
             <a:pPr lvl="1"/>
             <a:r>
-              <a:rPr lang="en-US" dirty="0" smtClean="0"/>
+              <a:rPr lang="en-US" dirty="0"/>
               <a:t>Type of medical supply – sterile, non-sterile, take home supply, etc.</a:t>
             </a:r>
           </a:p>
           <a:p>
             <a:pPr lvl="1"/>
             <a:r>
-              <a:rPr lang="en-US" dirty="0" smtClean="0"/>
+              <a:rPr lang="en-US" dirty="0"/>
               <a:t>Type of clinic – rural health clinic, family practice clinic, etc.</a:t>
             </a:r>
           </a:p>
           <a:p>
             <a:r>
-              <a:rPr lang="en-US" dirty="0" smtClean="0"/>
-              <a:t>The codes are designed to distinguish between similar procedures that have different costs due to the location where the service was provided, or the supplies used to perform the procedure.</a:t>
-            </a:r>
-            <a:r>
-              <a:rPr lang="en-US" dirty="0" smtClean="0"/>
-              <a:t> </a:t>
-            </a:r>
-          </a:p>
-        </p:txBody>
-      </p:sp>
+              <a:rPr lang="en-US" dirty="0"/>
+              <a:t>The codes are designed to distinguish between similar procedures that have different costs due to the location where the service was provided, or the supplies used to perform the procedure. </a:t>
+            </a:r>
+          </a:p>
+        </p:txBody>
+      </p:sp>
+      <p:pic>
+        <p:nvPicPr>
+          <p:cNvPr id="4" name="Audio 3">
+            <a:hlinkClick r:id="" action="ppaction://media"/>
+          </p:cNvPr>
+          <p:cNvPicPr>
+            <a:picLocks noChangeAspect="1"/>
+          </p:cNvPicPr>
+          <p:nvPr>
+            <a:audioFile r:link="rId2"/>
+            <p:extLst>
+              <p:ext uri="{DAA4B4D4-6D71-4841-9C94-3DE7FCFB9230}">
+                <p14:media xmlns:p14="http://schemas.microsoft.com/office/powerpoint/2010/main" r:embed="rId1"/>
+              </p:ext>
+            </p:extLst>
+          </p:nvPr>
+        </p:nvPicPr>
+        <p:blipFill>
+          <a:blip r:embed="rId4"/>
+          <a:stretch>
+            <a:fillRect/>
+          </a:stretch>
+        </p:blipFill>
+        <p:spPr>
+          <a:xfrm>
+            <a:off x="12945649" y="6030930"/>
+            <a:ext cx="609600" cy="609600"/>
+          </a:xfrm>
+          <a:prstGeom prst="rect">
+            <a:avLst/>
+          </a:prstGeom>
+        </p:spPr>
+      </p:pic>
     </p:spTree>
     <p:extLst>
       <p:ext uri="{BB962C8B-B14F-4D97-AF65-F5344CB8AC3E}">
@@ -6999,6 +7396,101 @@
   <p:clrMapOvr>
     <a:masterClrMapping/>
   </p:clrMapOvr>
+  <mc:AlternateContent xmlns:mc="http://schemas.openxmlformats.org/markup-compatibility/2006">
+    <mc:Choice xmlns:p14="http://schemas.microsoft.com/office/powerpoint/2010/main" Requires="p14">
+      <p:transition spd="slow" p14:dur="2000" advTm="38712"/>
+    </mc:Choice>
+    <mc:Fallback>
+      <p:transition spd="slow" advTm="38712"/>
+    </mc:Fallback>
+  </mc:AlternateContent>
+  <p:timing>
+    <p:tnLst>
+      <p:par>
+        <p:cTn id="1" dur="indefinite" restart="never" nodeType="tmRoot">
+          <p:childTnLst>
+            <p:seq concurrent="1" nextAc="seek">
+              <p:cTn id="2" dur="indefinite" nodeType="mainSeq">
+                <p:childTnLst>
+                  <p:par>
+                    <p:cTn id="3" fill="hold">
+                      <p:stCondLst>
+                        <p:cond delay="indefinite"/>
+                        <p:cond evt="onBegin" delay="0">
+                          <p:tn val="2"/>
+                        </p:cond>
+                      </p:stCondLst>
+                      <p:childTnLst>
+                        <p:par>
+                          <p:cTn id="4" fill="hold">
+                            <p:stCondLst>
+                              <p:cond delay="0"/>
+                            </p:stCondLst>
+                            <p:childTnLst>
+                              <p:par>
+                                <p:cTn id="5" presetID="1" presetClass="mediacall" presetSubtype="0" fill="hold" nodeType="afterEffect">
+                                  <p:stCondLst>
+                                    <p:cond delay="0"/>
+                                  </p:stCondLst>
+                                  <p:childTnLst>
+                                    <p:cmd type="call" cmd="playFrom(0.0)">
+                                      <p:cBhvr>
+                                        <p:cTn id="6" dur="1" fill="hold"/>
+                                        <p:tgtEl>
+                                          <p:spTgt spid="4"/>
+                                        </p:tgtEl>
+                                      </p:cBhvr>
+                                    </p:cmd>
+                                  </p:childTnLst>
+                                </p:cTn>
+                              </p:par>
+                            </p:childTnLst>
+                          </p:cTn>
+                        </p:par>
+                      </p:childTnLst>
+                    </p:cTn>
+                  </p:par>
+                </p:childTnLst>
+              </p:cTn>
+              <p:prevCondLst>
+                <p:cond evt="onPrev" delay="0">
+                  <p:tgtEl>
+                    <p:sldTgt/>
+                  </p:tgtEl>
+                </p:cond>
+              </p:prevCondLst>
+              <p:nextCondLst>
+                <p:cond evt="onNext" delay="0">
+                  <p:tgtEl>
+                    <p:sldTgt/>
+                  </p:tgtEl>
+                </p:cond>
+              </p:nextCondLst>
+            </p:seq>
+            <p:audio isNarration="1">
+              <p:cMediaNode vol="80000" showWhenStopped="0">
+                <p:cTn id="7" fill="hold" display="0">
+                  <p:stCondLst>
+                    <p:cond delay="indefinite"/>
+                  </p:stCondLst>
+                  <p:endCondLst>
+                    <p:cond evt="onStopAudio" delay="0">
+                      <p:tgtEl>
+                        <p:sldTgt/>
+                      </p:tgtEl>
+                    </p:cond>
+                  </p:endCondLst>
+                </p:cTn>
+                <p:tgtEl>
+                  <p:spTgt spid="4"/>
+                </p:tgtEl>
+              </p:cMediaNode>
+            </p:audio>
+          </p:childTnLst>
+        </p:cTn>
+      </p:par>
+    </p:tnLst>
+  </p:timing>
 </p:sld>
 </file>
 
@@ -7035,10 +7527,9 @@
           <a:lstStyle/>
           <a:p>
             <a:r>
-              <a:rPr lang="en-US" smtClean="0"/>
+              <a:rPr lang="en-US"/>
               <a:t>References</a:t>
             </a:r>
-            <a:endParaRPr lang="en-US"/>
           </a:p>
         </p:txBody>
       </p:sp>
@@ -7061,30 +7552,18 @@
               <a:rPr lang="en-US" dirty="0">
                 <a:hlinkClick r:id="rId2"/>
               </a:rPr>
-              <a:t>https://</a:t>
-            </a:r>
-            <a:r>
-              <a:rPr lang="en-US" dirty="0" smtClean="0">
-                <a:hlinkClick r:id="rId2"/>
-              </a:rPr>
-              <a:t>c.ymcdn.com/sites/www.mpca.net/resource/resmgr/billing_and_coding/medicare%20ub-04%20revenue%20codes.pdf</a:t>
-            </a:r>
-            <a:endParaRPr lang="en-US" dirty="0" smtClean="0"/>
+              <a:t>https://c.ymcdn.com/sites/www.mpca.net/resource/resmgr/billing_and_coding/medicare%20ub-04%20revenue%20codes.pdf</a:t>
+            </a:r>
+            <a:endParaRPr lang="en-US" dirty="0"/>
           </a:p>
           <a:p>
             <a:r>
               <a:rPr lang="en-US" dirty="0">
                 <a:hlinkClick r:id="rId3"/>
               </a:rPr>
-              <a:t>https://</a:t>
-            </a:r>
-            <a:r>
-              <a:rPr lang="en-US" dirty="0" smtClean="0">
-                <a:hlinkClick r:id="rId3"/>
-              </a:rPr>
-              <a:t>en.wikipedia.org/wiki/ICD-10</a:t>
-            </a:r>
-            <a:endParaRPr lang="en-US" dirty="0" smtClean="0"/>
+              <a:t>https://en.wikipedia.org/wiki/ICD-10</a:t>
+            </a:r>
+            <a:endParaRPr lang="en-US" dirty="0"/>
           </a:p>
           <a:p>
             <a:endParaRPr lang="en-US" dirty="0"/>
@@ -7101,6 +7580,14 @@
   <p:clrMapOvr>
     <a:masterClrMapping/>
   </p:clrMapOvr>
+  <mc:AlternateContent xmlns:mc="http://schemas.openxmlformats.org/markup-compatibility/2006">
+    <mc:Choice xmlns:p14="http://schemas.microsoft.com/office/powerpoint/2010/main" Requires="p14">
+      <p:transition spd="slow" p14:dur="2000" advTm="1001"/>
+    </mc:Choice>
+    <mc:Fallback>
+      <p:transition spd="slow" advTm="1001"/>
+    </mc:Fallback>
+  </mc:AlternateContent>
 </p:sld>
 </file>
 
@@ -7604,7 +8091,7 @@
   <a:extraClrSchemeLst/>
   <a:extLst>
     <a:ext uri="{05A4C25C-085E-4340-85A3-A5531E510DB2}">
-      <thm15:themeFamily xmlns:thm15="http://schemas.microsoft.com/office/thememl/2012/main" xmlns="" name="Gallery" id="{BBFCD31E-59A1-489D-B089-A3EAD7CAE12E}" vid="{AC464412-510E-4F2B-8947-A0DDBD028997}"/>
+      <thm15:themeFamily xmlns:thm15="http://schemas.microsoft.com/office/thememl/2012/main" name="Gallery" id="{BBFCD31E-59A1-489D-B089-A3EAD7CAE12E}" vid="{AC464412-510E-4F2B-8947-A0DDBD028997}"/>
     </a:ext>
   </a:extLst>
 </a:theme>

</xml_diff>